<commit_message>
Updated the config so that tests can run in multiple browsers
</commit_message>
<xml_diff>
--- a/Hooking Docker With Selenium.pptx
+++ b/Hooking Docker With Selenium.pptx
@@ -218,7 +218,7 @@
           <a:p>
             <a:fld id="{5C4B7F8B-09A9-4DC7-B144-8F249CA884D5}" type="datetimeFigureOut">
               <a:rPr lang="en-GB" smtClean="0"/>
-              <a:t>23/09/2015</a:t>
+              <a:t>30/10/2015</a:t>
             </a:fld>
             <a:endParaRPr lang="en-GB"/>
           </a:p>
@@ -1225,7 +1225,7 @@
           <a:p>
             <a:fld id="{8E476717-365A-48AB-ADE2-5D5B997BC131}" type="datetimeFigureOut">
               <a:rPr lang="en-GB" smtClean="0"/>
-              <a:t>23/09/2015</a:t>
+              <a:t>30/10/2015</a:t>
             </a:fld>
             <a:endParaRPr lang="en-GB"/>
           </a:p>
@@ -1538,7 +1538,7 @@
           <a:p>
             <a:fld id="{8E476717-365A-48AB-ADE2-5D5B997BC131}" type="datetimeFigureOut">
               <a:rPr lang="en-GB" smtClean="0"/>
-              <a:t>23/09/2015</a:t>
+              <a:t>30/10/2015</a:t>
             </a:fld>
             <a:endParaRPr lang="en-GB"/>
           </a:p>
@@ -1723,7 +1723,7 @@
           <a:p>
             <a:fld id="{8E476717-365A-48AB-ADE2-5D5B997BC131}" type="datetimeFigureOut">
               <a:rPr lang="en-GB" smtClean="0"/>
-              <a:t>23/09/2015</a:t>
+              <a:t>30/10/2015</a:t>
             </a:fld>
             <a:endParaRPr lang="en-GB"/>
           </a:p>
@@ -1898,7 +1898,7 @@
           <a:p>
             <a:fld id="{8E476717-365A-48AB-ADE2-5D5B997BC131}" type="datetimeFigureOut">
               <a:rPr lang="en-GB" smtClean="0"/>
-              <a:t>23/09/2015</a:t>
+              <a:t>30/10/2015</a:t>
             </a:fld>
             <a:endParaRPr lang="en-GB"/>
           </a:p>
@@ -2166,7 +2166,7 @@
           <a:p>
             <a:fld id="{8E476717-365A-48AB-ADE2-5D5B997BC131}" type="datetimeFigureOut">
               <a:rPr lang="en-GB" smtClean="0"/>
-              <a:t>23/09/2015</a:t>
+              <a:t>30/10/2015</a:t>
             </a:fld>
             <a:endParaRPr lang="en-GB"/>
           </a:p>
@@ -2634,7 +2634,7 @@
           <a:p>
             <a:fld id="{8E476717-365A-48AB-ADE2-5D5B997BC131}" type="datetimeFigureOut">
               <a:rPr lang="en-GB" smtClean="0"/>
-              <a:t>23/09/2015</a:t>
+              <a:t>30/10/2015</a:t>
             </a:fld>
             <a:endParaRPr lang="en-GB"/>
           </a:p>
@@ -3123,7 +3123,7 @@
           <a:p>
             <a:fld id="{8E476717-365A-48AB-ADE2-5D5B997BC131}" type="datetimeFigureOut">
               <a:rPr lang="en-GB" smtClean="0"/>
-              <a:t>23/09/2015</a:t>
+              <a:t>30/10/2015</a:t>
             </a:fld>
             <a:endParaRPr lang="en-GB"/>
           </a:p>
@@ -3249,7 +3249,7 @@
           <a:p>
             <a:fld id="{8E476717-365A-48AB-ADE2-5D5B997BC131}" type="datetimeFigureOut">
               <a:rPr lang="en-GB" smtClean="0"/>
-              <a:t>23/09/2015</a:t>
+              <a:t>30/10/2015</a:t>
             </a:fld>
             <a:endParaRPr lang="en-GB"/>
           </a:p>
@@ -3393,7 +3393,7 @@
           <a:p>
             <a:fld id="{8E476717-365A-48AB-ADE2-5D5B997BC131}" type="datetimeFigureOut">
               <a:rPr lang="en-GB" smtClean="0"/>
-              <a:t>23/09/2015</a:t>
+              <a:t>30/10/2015</a:t>
             </a:fld>
             <a:endParaRPr lang="en-GB"/>
           </a:p>
@@ -3715,7 +3715,7 @@
           <a:p>
             <a:fld id="{8E476717-365A-48AB-ADE2-5D5B997BC131}" type="datetimeFigureOut">
               <a:rPr lang="en-GB" smtClean="0"/>
-              <a:t>23/09/2015</a:t>
+              <a:t>30/10/2015</a:t>
             </a:fld>
             <a:endParaRPr lang="en-GB"/>
           </a:p>
@@ -3849,7 +3849,7 @@
           <a:p>
             <a:fld id="{8E476717-365A-48AB-ADE2-5D5B997BC131}" type="datetimeFigureOut">
               <a:rPr lang="en-GB" smtClean="0"/>
-              <a:t>23/09/2015</a:t>
+              <a:t>30/10/2015</a:t>
             </a:fld>
             <a:endParaRPr lang="en-GB"/>
           </a:p>
@@ -4630,7 +4630,7 @@
           <a:p>
             <a:fld id="{8E476717-365A-48AB-ADE2-5D5B997BC131}" type="datetimeFigureOut">
               <a:rPr lang="en-GB" smtClean="0"/>
-              <a:t>23/09/2015</a:t>
+              <a:t>30/10/2015</a:t>
             </a:fld>
             <a:endParaRPr lang="en-GB"/>
           </a:p>
@@ -5150,19 +5150,7 @@
           <a:p>
             <a:r>
               <a:rPr lang="en-GB" dirty="0" smtClean="0"/>
-              <a:t>Integrate </a:t>
-            </a:r>
-            <a:r>
-              <a:rPr lang="en-GB" dirty="0" smtClean="0"/>
-              <a:t>Docker </a:t>
-            </a:r>
-            <a:r>
-              <a:rPr lang="en-GB" dirty="0" smtClean="0"/>
-              <a:t>With </a:t>
-            </a:r>
-            <a:r>
-              <a:rPr lang="en-GB" dirty="0" smtClean="0"/>
-              <a:t>Selenium-C#- </a:t>
+              <a:t>Integrate Docker With Selenium-C#- </a:t>
             </a:r>
             <a:r>
               <a:rPr lang="en-GB" dirty="0" err="1" smtClean="0"/>
@@ -6288,7 +6276,11 @@
             </a:r>
             <a:r>
               <a:rPr lang="en-GB" sz="1700" dirty="0" smtClean="0"/>
-              <a:t> pull selenium/</a:t>
+              <a:t> pull </a:t>
+            </a:r>
+            <a:r>
+              <a:rPr lang="en-GB" sz="1700" dirty="0" smtClean="0"/>
+              <a:t>selenium/</a:t>
             </a:r>
             <a:r>
               <a:rPr lang="en-GB" sz="1700" dirty="0" err="1" smtClean="0"/>
@@ -6298,6 +6290,30 @@
           </a:p>
           <a:p>
             <a:pPr lvl="2"/>
+            <a:r>
+              <a:rPr lang="en-GB" sz="1700" dirty="0" err="1"/>
+              <a:t>docker</a:t>
+            </a:r>
+            <a:r>
+              <a:rPr lang="en-GB" sz="1700" dirty="0"/>
+              <a:t> pull </a:t>
+            </a:r>
+            <a:r>
+              <a:rPr lang="en-GB" sz="1700" dirty="0" err="1"/>
+              <a:t>akeem</a:t>
+            </a:r>
+            <a:r>
+              <a:rPr lang="en-GB" sz="1700" dirty="0"/>
+              <a:t>/selenium-node-</a:t>
+            </a:r>
+            <a:r>
+              <a:rPr lang="en-GB" sz="1700" dirty="0" err="1"/>
+              <a:t>phantomjs</a:t>
+            </a:r>
+            <a:endParaRPr lang="en-GB" sz="1700" dirty="0" smtClean="0"/>
+          </a:p>
+          <a:p>
+            <a:pPr lvl="2"/>
             <a:endParaRPr lang="en-GB" sz="1800" dirty="0" smtClean="0"/>
           </a:p>
           <a:p>
@@ -6332,10 +6348,9 @@
               <a:t>~/</a:t>
             </a:r>
             <a:r>
-              <a:rPr lang="en-GB" sz="1800" smtClean="0"/>
+              <a:rPr lang="en-GB" sz="1800" dirty="0" smtClean="0"/>
               <a:t>Downloads/docker_selenium_node_chrome.2.46.0.tar    selenium/node-chrome:2.46.0</a:t>
             </a:r>
-            <a:endParaRPr lang="en-GB" sz="1800" dirty="0" smtClean="0"/>
           </a:p>
           <a:p>
             <a:pPr lvl="1"/>
@@ -6546,8 +6561,44 @@
             </a:r>
             <a:r>
               <a:rPr lang="en-GB" sz="1800" dirty="0" smtClean="0"/>
-              <a:t> selenium/node-chrome:2.45.0</a:t>
-            </a:r>
+              <a:t> </a:t>
+            </a:r>
+            <a:r>
+              <a:rPr lang="en-GB" sz="1800" dirty="0" smtClean="0"/>
+              <a:t>selenium/node-chrome:2.45.0</a:t>
+            </a:r>
+          </a:p>
+          <a:p>
+            <a:pPr lvl="1"/>
+            <a:r>
+              <a:rPr lang="en-GB" sz="1800" dirty="0" err="1"/>
+              <a:t>docker</a:t>
+            </a:r>
+            <a:r>
+              <a:rPr lang="en-GB" sz="1800" dirty="0"/>
+              <a:t> run -d --link </a:t>
+            </a:r>
+            <a:r>
+              <a:rPr lang="en-GB" sz="1800" dirty="0" err="1"/>
+              <a:t>selenium-hub:hub</a:t>
+            </a:r>
+            <a:r>
+              <a:rPr lang="en-GB" sz="1800" dirty="0"/>
+              <a:t> </a:t>
+            </a:r>
+            <a:r>
+              <a:rPr lang="en-GB" sz="1800" dirty="0" err="1"/>
+              <a:t>akeem</a:t>
+            </a:r>
+            <a:r>
+              <a:rPr lang="en-GB" sz="1800" dirty="0"/>
+              <a:t>/selenium-node-</a:t>
+            </a:r>
+            <a:r>
+              <a:rPr lang="en-GB" sz="1800" dirty="0" err="1"/>
+              <a:t>phantomjs</a:t>
+            </a:r>
+            <a:endParaRPr lang="en-GB" sz="1800" dirty="0" smtClean="0"/>
           </a:p>
           <a:p>
             <a:pPr lvl="1"/>
@@ -6704,11 +6755,7 @@
             </a:r>
             <a:r>
               <a:rPr lang="en-GB" dirty="0" smtClean="0"/>
-              <a:t> </a:t>
-            </a:r>
-            <a:r>
-              <a:rPr lang="en-GB" dirty="0" smtClean="0"/>
-              <a:t>address</a:t>
+              <a:t> address</a:t>
             </a:r>
           </a:p>
           <a:p>

</xml_diff>